<commit_message>
Fixed some typos in set 15
Signed-off-by: Jason Nicholson <jashale@yahoo.com>
</commit_message>
<xml_diff>
--- a/me511_S14__Lect.Notes_Set15.pptx
+++ b/me511_S14__Lect.Notes_Set15.pptx
@@ -167,7 +167,7 @@
   </p:defaultTextStyle>
   <p:extLst>
     <p:ext uri="{EFAFB233-063F-42B5-8137-9DF3F51BA10A}">
-      <p15:sldGuideLst xmlns:p15="http://schemas.microsoft.com/office/powerpoint/2012/main" xmlns="">
+      <p15:sldGuideLst xmlns="" xmlns:p15="http://schemas.microsoft.com/office/powerpoint/2012/main">
         <p15:guide id="1" orient="horz" pos="2162">
           <p15:clr>
             <a:srgbClr val="A4A3A4"/>
@@ -3183,8 +3183,8 @@
           <a:chExt cx="0" cy="0"/>
         </a:xfrm>
       </p:grpSpPr>
-      <mc:AlternateContent xmlns:mc="http://schemas.openxmlformats.org/markup-compatibility/2006">
-        <mc:Choice xmlns:a14="http://schemas.microsoft.com/office/drawing/2010/main" Requires="a14">
+      <mc:AlternateContent xmlns:mc="http://schemas.openxmlformats.org/markup-compatibility/2006" xmlns:a14="http://schemas.microsoft.com/office/drawing/2010/main">
+        <mc:Choice Requires="a14">
           <p:sp>
             <p:nvSpPr>
               <p:cNvPr id="2" name="Text Placeholder 1"/>
@@ -3915,7 +3915,7 @@
             </p:txBody>
           </p:sp>
         </mc:Choice>
-        <mc:Fallback>
+        <mc:Fallback xmlns="">
           <p:sp>
             <p:nvSpPr>
               <p:cNvPr id="2" name="Text Placeholder 1"/>
@@ -4002,8 +4002,8 @@
           <a:chExt cx="0" cy="0"/>
         </a:xfrm>
       </p:grpSpPr>
-      <mc:AlternateContent xmlns:mc="http://schemas.openxmlformats.org/markup-compatibility/2006">
-        <mc:Choice xmlns:a14="http://schemas.microsoft.com/office/drawing/2010/main" Requires="a14">
+      <mc:AlternateContent xmlns:mc="http://schemas.openxmlformats.org/markup-compatibility/2006" xmlns:a14="http://schemas.microsoft.com/office/drawing/2010/main">
+        <mc:Choice Requires="a14">
           <p:sp>
             <p:nvSpPr>
               <p:cNvPr id="2" name="Text Placeholder 1"/>
@@ -4946,7 +4946,7 @@
             </p:txBody>
           </p:sp>
         </mc:Choice>
-        <mc:Fallback>
+        <mc:Fallback xmlns="">
           <p:sp>
             <p:nvSpPr>
               <p:cNvPr id="2" name="Text Placeholder 1"/>
@@ -5033,8 +5033,8 @@
           <a:chExt cx="0" cy="0"/>
         </a:xfrm>
       </p:grpSpPr>
-      <mc:AlternateContent xmlns:mc="http://schemas.openxmlformats.org/markup-compatibility/2006" xmlns:a14="http://schemas.microsoft.com/office/drawing/2010/main">
-        <mc:Choice Requires="a14">
+      <mc:AlternateContent xmlns:mc="http://schemas.openxmlformats.org/markup-compatibility/2006">
+        <mc:Choice xmlns:a14="http://schemas.microsoft.com/office/drawing/2010/main" Requires="a14">
           <p:sp>
             <p:nvSpPr>
               <p:cNvPr id="2" name="Text Placeholder 1"/>
@@ -5219,6 +5219,12 @@
                             </a:rPr>
                             <m:t>3</m:t>
                           </m:r>
+                          <m:r>
+                            <a:rPr lang="en-US" b="0" i="1" smtClean="0">
+                              <a:latin typeface="Cambria Math"/>
+                            </a:rPr>
+                            <m:t>𝑥</m:t>
+                          </m:r>
                           <m:sSup>
                             <m:sSupPr>
                               <m:ctrlPr>
@@ -5228,39 +5234,33 @@
                               </m:ctrlPr>
                             </m:sSupPr>
                             <m:e>
-                              <m:r>
-                                <a:rPr lang="en-US" b="0" i="1" smtClean="0">
-                                  <a:latin typeface="Cambria Math" panose="02040503050406030204" pitchFamily="18" charset="0"/>
-                                </a:rPr>
-                                <m:t>𝑥</m:t>
-                              </m:r>
+                              <m:d>
+                                <m:dPr>
+                                  <m:ctrlPr>
+                                    <a:rPr lang="en-US" b="0" i="1" smtClean="0">
+                                      <a:latin typeface="Cambria Math"/>
+                                    </a:rPr>
+                                  </m:ctrlPr>
+                                </m:dPr>
+                                <m:e>
+                                  <m:r>
+                                    <a:rPr lang="en-US" b="0" i="1" smtClean="0">
+                                      <a:latin typeface="Cambria Math" panose="02040503050406030204" pitchFamily="18" charset="0"/>
+                                    </a:rPr>
+                                    <m:t>5</m:t>
+                                  </m:r>
+                                </m:e>
+                              </m:d>
                             </m:e>
                             <m:sup>
                               <m:r>
                                 <a:rPr lang="en-US" b="0" i="1" smtClean="0">
-                                  <a:latin typeface="Cambria Math" panose="02040503050406030204" pitchFamily="18" charset="0"/>
+                                  <a:latin typeface="Cambria Math"/>
                                 </a:rPr>
                                 <m:t>2</m:t>
                               </m:r>
                             </m:sup>
                           </m:sSup>
-                          <m:d>
-                            <m:dPr>
-                              <m:ctrlPr>
-                                <a:rPr lang="en-US" b="0" i="1" smtClean="0">
-                                  <a:latin typeface="Cambria Math"/>
-                                </a:rPr>
-                              </m:ctrlPr>
-                            </m:dPr>
-                            <m:e>
-                              <m:r>
-                                <a:rPr lang="en-US" b="0" i="1" smtClean="0">
-                                  <a:latin typeface="Cambria Math" panose="02040503050406030204" pitchFamily="18" charset="0"/>
-                                </a:rPr>
-                                <m:t>5</m:t>
-                              </m:r>
-                            </m:e>
-                          </m:d>
                         </m:e>
                       </m:d>
                       <m:r>
@@ -5934,7 +5934,7 @@
             </p:txBody>
           </p:sp>
         </mc:Choice>
-        <mc:Fallback xmlns="">
+        <mc:Fallback>
           <p:sp>
             <p:nvSpPr>
               <p:cNvPr id="2" name="Text Placeholder 1"/>
@@ -5946,7 +5946,7 @@
               </p:nvPr>
             </p:nvSpPr>
             <p:spPr>
-              <a:blipFill rotWithShape="0">
+              <a:blipFill rotWithShape="1">
                 <a:blip r:embed="rId2"/>
                 <a:stretch>
                   <a:fillRect l="-2178"/>
@@ -6021,8 +6021,8 @@
           <a:chExt cx="0" cy="0"/>
         </a:xfrm>
       </p:grpSpPr>
-      <mc:AlternateContent xmlns:mc="http://schemas.openxmlformats.org/markup-compatibility/2006" xmlns:a14="http://schemas.microsoft.com/office/drawing/2010/main">
-        <mc:Choice Requires="a14">
+      <mc:AlternateContent xmlns:mc="http://schemas.openxmlformats.org/markup-compatibility/2006">
+        <mc:Choice xmlns:a14="http://schemas.microsoft.com/office/drawing/2010/main" Requires="a14">
           <p:sp>
             <p:nvSpPr>
               <p:cNvPr id="2" name="Text Placeholder 1"/>
@@ -6223,461 +6223,409 @@
                       <m:jc m:val="centerGroup"/>
                     </m:oMathParaPr>
                     <m:oMath xmlns:m="http://schemas.openxmlformats.org/officeDocument/2006/math">
-                      <m:m>
-                        <m:mPr>
-                          <m:mcs>
-                            <m:mc>
-                              <m:mcPr>
-                                <m:count m:val="3"/>
-                                <m:mcJc m:val="center"/>
-                              </m:mcPr>
-                            </m:mc>
-                          </m:mcs>
+                      <m:sSup>
+                        <m:sSupPr>
                           <m:ctrlPr>
-                            <a:rPr lang="en-US" b="0" i="1" smtClean="0">
+                            <a:rPr lang="en-US" i="1">
                               <a:latin typeface="Cambria Math"/>
                             </a:rPr>
                           </m:ctrlPr>
-                        </m:mPr>
-                        <m:mr>
-                          <m:e>
-                            <m:r>
-                              <m:rPr>
-                                <m:brk m:alnAt="7"/>
-                              </m:rPr>
-                              <a:rPr lang="en-US" b="0" i="1" smtClean="0">
-                                <a:latin typeface="Cambria Math" panose="02040503050406030204" pitchFamily="18" charset="0"/>
-                              </a:rPr>
-                              <m:t> </m:t>
-                            </m:r>
-                          </m:e>
-                          <m:e>
-                            <m:sSup>
-                              <m:sSupPr>
-                                <m:ctrlPr>
-                                  <a:rPr lang="en-US" i="1">
-                                    <a:latin typeface="Cambria Math"/>
-                                  </a:rPr>
-                                </m:ctrlPr>
-                              </m:sSupPr>
-                              <m:e>
-                                <m:d>
-                                  <m:dPr>
-                                    <m:ctrlPr>
-                                      <a:rPr lang="en-US" i="1">
-                                        <a:latin typeface="Cambria Math"/>
-                                      </a:rPr>
-                                    </m:ctrlPr>
-                                  </m:dPr>
+                        </m:sSupPr>
+                        <m:e>
+                          <m:d>
+                            <m:dPr>
+                              <m:ctrlPr>
+                                <a:rPr lang="en-US" i="1">
+                                  <a:latin typeface="Cambria Math"/>
+                                </a:rPr>
+                              </m:ctrlPr>
+                            </m:dPr>
+                            <m:e>
+                              <m:r>
+                                <a:rPr lang="en-US" i="1">
+                                  <a:latin typeface="Cambria Math" panose="02040503050406030204" pitchFamily="18" charset="0"/>
+                                </a:rPr>
+                                <m:t>𝑠𝐼</m:t>
+                              </m:r>
+                              <m:r>
+                                <a:rPr lang="en-US" i="1">
+                                  <a:latin typeface="Cambria Math" panose="02040503050406030204" pitchFamily="18" charset="0"/>
+                                </a:rPr>
+                                <m:t>−</m:t>
+                              </m:r>
+                              <m:r>
+                                <a:rPr lang="en-US" i="1">
+                                  <a:latin typeface="Cambria Math" panose="02040503050406030204" pitchFamily="18" charset="0"/>
+                                </a:rPr>
+                                <m:t>ℋ</m:t>
+                              </m:r>
+                            </m:e>
+                          </m:d>
+                        </m:e>
+                        <m:sup>
+                          <m:r>
+                            <a:rPr lang="en-US" i="1">
+                              <a:latin typeface="Cambria Math" panose="02040503050406030204" pitchFamily="18" charset="0"/>
+                            </a:rPr>
+                            <m:t>−1</m:t>
+                          </m:r>
+                        </m:sup>
+                      </m:sSup>
+                      <m:r>
+                        <m:rPr>
+                          <m:aln/>
+                        </m:rPr>
+                        <a:rPr lang="en-US" i="1">
+                          <a:latin typeface="Cambria Math" panose="02040503050406030204" pitchFamily="18" charset="0"/>
+                        </a:rPr>
+                        <m:t>=</m:t>
+                      </m:r>
+                      <m:sSup>
+                        <m:sSupPr>
+                          <m:ctrlPr>
+                            <a:rPr lang="en-US" i="1">
+                              <a:latin typeface="Cambria Math"/>
+                            </a:rPr>
+                          </m:ctrlPr>
+                        </m:sSupPr>
+                        <m:e>
+                          <m:d>
+                            <m:dPr>
+                              <m:begChr m:val="["/>
+                              <m:endChr m:val="]"/>
+                              <m:ctrlPr>
+                                <a:rPr lang="en-US" i="1">
+                                  <a:latin typeface="Cambria Math"/>
+                                </a:rPr>
+                              </m:ctrlPr>
+                            </m:dPr>
+                            <m:e>
+                              <m:m>
+                                <m:mPr>
+                                  <m:plcHide m:val="on"/>
+                                  <m:mcs>
+                                    <m:mc>
+                                      <m:mcPr>
+                                        <m:count m:val="2"/>
+                                        <m:mcJc m:val="center"/>
+                                      </m:mcPr>
+                                    </m:mc>
+                                  </m:mcs>
+                                  <m:ctrlPr>
+                                    <a:rPr lang="en-US" i="1">
+                                      <a:latin typeface="Cambria Math"/>
+                                    </a:rPr>
+                                  </m:ctrlPr>
+                                </m:mPr>
+                                <m:mr>
                                   <m:e>
                                     <m:r>
                                       <a:rPr lang="en-US" i="1">
                                         <a:latin typeface="Cambria Math" panose="02040503050406030204" pitchFamily="18" charset="0"/>
                                       </a:rPr>
-                                      <m:t>𝑠𝐼</m:t>
+                                      <m:t>𝑠</m:t>
                                     </m:r>
                                     <m:r>
                                       <a:rPr lang="en-US" i="1">
                                         <a:latin typeface="Cambria Math" panose="02040503050406030204" pitchFamily="18" charset="0"/>
                                       </a:rPr>
-                                      <m:t>−</m:t>
+                                      <m:t>−2</m:t>
+                                    </m:r>
+                                  </m:e>
+                                  <m:e>
+                                    <m:r>
+                                      <a:rPr lang="en-US" i="1">
+                                        <a:latin typeface="Cambria Math" panose="02040503050406030204" pitchFamily="18" charset="0"/>
+                                      </a:rPr>
+                                      <m:t>1</m:t>
+                                    </m:r>
+                                  </m:e>
+                                </m:mr>
+                                <m:mr>
+                                  <m:e>
+                                    <m:r>
+                                      <a:rPr lang="en-US" i="1">
+                                        <a:latin typeface="Cambria Math" panose="02040503050406030204" pitchFamily="18" charset="0"/>
+                                      </a:rPr>
+                                      <m:t>5</m:t>
+                                    </m:r>
+                                  </m:e>
+                                  <m:e>
+                                    <m:r>
+                                      <a:rPr lang="en-US" i="1">
+                                        <a:latin typeface="Cambria Math" panose="02040503050406030204" pitchFamily="18" charset="0"/>
+                                      </a:rPr>
+                                      <m:t>𝑠</m:t>
                                     </m:r>
                                     <m:r>
                                       <a:rPr lang="en-US" i="1">
                                         <a:latin typeface="Cambria Math" panose="02040503050406030204" pitchFamily="18" charset="0"/>
                                       </a:rPr>
-                                      <m:t>ℋ</m:t>
+                                      <m:t>+2</m:t>
                                     </m:r>
                                   </m:e>
-                                </m:d>
+                                </m:mr>
+                              </m:m>
+                            </m:e>
+                          </m:d>
+                        </m:e>
+                        <m:sup>
+                          <m:r>
+                            <a:rPr lang="en-US" i="1">
+                              <a:latin typeface="Cambria Math" panose="02040503050406030204" pitchFamily="18" charset="0"/>
+                            </a:rPr>
+                            <m:t>−1</m:t>
+                          </m:r>
+                        </m:sup>
+                      </m:sSup>
+                    </m:oMath>
+                    <m:oMath xmlns:m="http://schemas.openxmlformats.org/officeDocument/2006/math">
+                      <m:r>
+                        <m:rPr>
+                          <m:aln/>
+                        </m:rPr>
+                        <a:rPr lang="en-US" i="1">
+                          <a:latin typeface="Cambria Math" panose="02040503050406030204" pitchFamily="18" charset="0"/>
+                        </a:rPr>
+                        <m:t>=</m:t>
+                      </m:r>
+                      <m:f>
+                        <m:fPr>
+                          <m:ctrlPr>
+                            <a:rPr lang="en-US" i="1">
+                              <a:latin typeface="Cambria Math"/>
+                            </a:rPr>
+                          </m:ctrlPr>
+                        </m:fPr>
+                        <m:num>
+                          <m:r>
+                            <a:rPr lang="en-US" i="1">
+                              <a:latin typeface="Cambria Math" panose="02040503050406030204" pitchFamily="18" charset="0"/>
+                            </a:rPr>
+                            <m:t>1</m:t>
+                          </m:r>
+                        </m:num>
+                        <m:den>
+                          <m:sSup>
+                            <m:sSupPr>
+                              <m:ctrlPr>
+                                <a:rPr lang="en-US" i="1">
+                                  <a:latin typeface="Cambria Math"/>
+                                </a:rPr>
+                              </m:ctrlPr>
+                            </m:sSupPr>
+                            <m:e>
+                              <m:r>
+                                <a:rPr lang="en-US" i="1">
+                                  <a:latin typeface="Cambria Math" panose="02040503050406030204" pitchFamily="18" charset="0"/>
+                                </a:rPr>
+                                <m:t>𝑠</m:t>
+                              </m:r>
+                            </m:e>
+                            <m:sup>
+                              <m:r>
+                                <a:rPr lang="en-US" i="1">
+                                  <a:latin typeface="Cambria Math" panose="02040503050406030204" pitchFamily="18" charset="0"/>
+                                </a:rPr>
+                                <m:t>2</m:t>
+                              </m:r>
+                            </m:sup>
+                          </m:sSup>
+                          <m:r>
+                            <a:rPr lang="en-US" i="1">
+                              <a:latin typeface="Cambria Math" panose="02040503050406030204" pitchFamily="18" charset="0"/>
+                            </a:rPr>
+                            <m:t>−9</m:t>
+                          </m:r>
+                        </m:den>
+                      </m:f>
+                      <m:d>
+                        <m:dPr>
+                          <m:begChr m:val="["/>
+                          <m:endChr m:val="]"/>
+                          <m:ctrlPr>
+                            <a:rPr lang="en-US" i="1">
+                              <a:latin typeface="Cambria Math"/>
+                            </a:rPr>
+                          </m:ctrlPr>
+                        </m:dPr>
+                        <m:e>
+                          <m:m>
+                            <m:mPr>
+                              <m:mcs>
+                                <m:mc>
+                                  <m:mcPr>
+                                    <m:count m:val="2"/>
+                                    <m:mcJc m:val="center"/>
+                                  </m:mcPr>
+                                </m:mc>
+                              </m:mcs>
+                              <m:ctrlPr>
+                                <a:rPr lang="en-US" i="1">
+                                  <a:latin typeface="Cambria Math"/>
+                                </a:rPr>
+                              </m:ctrlPr>
+                            </m:mPr>
+                            <m:mr>
+                              <m:e>
+                                <m:r>
+                                  <m:rPr>
+                                    <m:brk m:alnAt="7"/>
+                                  </m:rPr>
+                                  <a:rPr lang="en-US" i="1">
+                                    <a:latin typeface="Cambria Math" panose="02040503050406030204" pitchFamily="18" charset="0"/>
+                                  </a:rPr>
+                                  <m:t>𝑠</m:t>
+                                </m:r>
+                                <m:r>
+                                  <a:rPr lang="en-US" i="1">
+                                    <a:latin typeface="Cambria Math" panose="02040503050406030204" pitchFamily="18" charset="0"/>
+                                  </a:rPr>
+                                  <m:t>+</m:t>
+                                </m:r>
+                                <m:r>
+                                  <m:rPr>
+                                    <m:brk m:alnAt="7"/>
+                                  </m:rPr>
+                                  <a:rPr lang="en-US" i="1">
+                                    <a:latin typeface="Cambria Math" panose="02040503050406030204" pitchFamily="18" charset="0"/>
+                                  </a:rPr>
+                                  <m:t>2</m:t>
+                                </m:r>
                               </m:e>
-                              <m:sup>
+                              <m:e>
                                 <m:r>
                                   <a:rPr lang="en-US" i="1">
                                     <a:latin typeface="Cambria Math" panose="02040503050406030204" pitchFamily="18" charset="0"/>
                                   </a:rPr>
                                   <m:t>−1</m:t>
                                 </m:r>
-                              </m:sup>
-                            </m:sSup>
-                            <m:r>
-                              <a:rPr lang="en-US" i="1">
-                                <a:latin typeface="Cambria Math" panose="02040503050406030204" pitchFamily="18" charset="0"/>
-                              </a:rPr>
-                              <m:t>=</m:t>
-                            </m:r>
-                          </m:e>
-                          <m:e>
-                            <m:sSup>
-                              <m:sSupPr>
-                                <m:ctrlPr>
-                                  <a:rPr lang="en-US" i="1">
-                                    <a:latin typeface="Cambria Math"/>
-                                  </a:rPr>
-                                </m:ctrlPr>
-                              </m:sSupPr>
+                              </m:e>
+                            </m:mr>
+                            <m:mr>
                               <m:e>
-                                <m:d>
-                                  <m:dPr>
-                                    <m:begChr m:val="["/>
-                                    <m:endChr m:val="]"/>
-                                    <m:ctrlPr>
-                                      <a:rPr lang="en-US" i="1">
-                                        <a:latin typeface="Cambria Math"/>
-                                      </a:rPr>
-                                    </m:ctrlPr>
-                                  </m:dPr>
-                                  <m:e>
-                                    <m:m>
-                                      <m:mPr>
-                                        <m:plcHide m:val="on"/>
-                                        <m:mcs>
-                                          <m:mc>
-                                            <m:mcPr>
-                                              <m:count m:val="2"/>
-                                              <m:mcJc m:val="center"/>
-                                            </m:mcPr>
-                                          </m:mc>
-                                        </m:mcs>
-                                        <m:ctrlPr>
-                                          <a:rPr lang="en-US" i="1">
-                                            <a:latin typeface="Cambria Math"/>
-                                          </a:rPr>
-                                        </m:ctrlPr>
-                                      </m:mPr>
-                                      <m:mr>
-                                        <m:e>
-                                          <m:r>
-                                            <a:rPr lang="en-US" i="1">
-                                              <a:latin typeface="Cambria Math" panose="02040503050406030204" pitchFamily="18" charset="0"/>
-                                            </a:rPr>
-                                            <m:t>𝑠</m:t>
-                                          </m:r>
-                                          <m:r>
-                                            <a:rPr lang="en-US" i="1">
-                                              <a:latin typeface="Cambria Math" panose="02040503050406030204" pitchFamily="18" charset="0"/>
-                                            </a:rPr>
-                                            <m:t>−2</m:t>
-                                          </m:r>
-                                        </m:e>
-                                        <m:e>
-                                          <m:r>
-                                            <a:rPr lang="en-US" i="1">
-                                              <a:latin typeface="Cambria Math" panose="02040503050406030204" pitchFamily="18" charset="0"/>
-                                            </a:rPr>
-                                            <m:t>1</m:t>
-                                          </m:r>
-                                        </m:e>
-                                      </m:mr>
-                                      <m:mr>
-                                        <m:e>
-                                          <m:r>
-                                            <a:rPr lang="en-US" i="1">
-                                              <a:latin typeface="Cambria Math" panose="02040503050406030204" pitchFamily="18" charset="0"/>
-                                            </a:rPr>
-                                            <m:t>5</m:t>
-                                          </m:r>
-                                        </m:e>
-                                        <m:e>
-                                          <m:r>
-                                            <a:rPr lang="en-US" i="1">
-                                              <a:latin typeface="Cambria Math" panose="02040503050406030204" pitchFamily="18" charset="0"/>
-                                            </a:rPr>
-                                            <m:t>𝑠</m:t>
-                                          </m:r>
-                                          <m:r>
-                                            <a:rPr lang="en-US" i="1">
-                                              <a:latin typeface="Cambria Math" panose="02040503050406030204" pitchFamily="18" charset="0"/>
-                                            </a:rPr>
-                                            <m:t>+2</m:t>
-                                          </m:r>
-                                        </m:e>
-                                      </m:mr>
-                                    </m:m>
-                                  </m:e>
-                                </m:d>
-                              </m:e>
-                              <m:sup>
                                 <m:r>
                                   <a:rPr lang="en-US" i="1">
                                     <a:latin typeface="Cambria Math" panose="02040503050406030204" pitchFamily="18" charset="0"/>
                                   </a:rPr>
-                                  <m:t>−1</m:t>
+                                  <m:t>−2</m:t>
                                 </m:r>
-                              </m:sup>
-                            </m:sSup>
-                          </m:e>
-                        </m:mr>
-                        <m:mr>
-                          <m:e>
-                            <m:r>
-                              <a:rPr lang="en-US" b="0" i="1" smtClean="0">
-                                <a:latin typeface="Cambria Math" panose="02040503050406030204" pitchFamily="18" charset="0"/>
-                              </a:rPr>
-                              <m:t> </m:t>
-                            </m:r>
-                          </m:e>
-                          <m:e>
-                            <m:r>
-                              <a:rPr lang="en-US" b="0" i="1" smtClean="0">
-                                <a:latin typeface="Cambria Math" panose="02040503050406030204" pitchFamily="18" charset="0"/>
-                              </a:rPr>
-                              <m:t> </m:t>
-                            </m:r>
-                          </m:e>
-                          <m:e>
-                            <m:r>
-                              <a:rPr lang="en-US" b="0" i="1" smtClean="0">
-                                <a:latin typeface="Cambria Math" panose="02040503050406030204" pitchFamily="18" charset="0"/>
-                              </a:rPr>
-                              <m:t>⇓</m:t>
-                            </m:r>
-                          </m:e>
-                        </m:mr>
-                        <m:mr>
-                          <m:e>
-                            <m:r>
-                              <a:rPr lang="en-US" b="0" i="1" smtClean="0">
-                                <a:latin typeface="Cambria Math" panose="02040503050406030204" pitchFamily="18" charset="0"/>
-                              </a:rPr>
-                              <m:t>ℋ</m:t>
-                            </m:r>
-                            <m:r>
-                              <a:rPr lang="en-US" b="0" i="1" smtClean="0">
-                                <a:latin typeface="Cambria Math" panose="02040503050406030204" pitchFamily="18" charset="0"/>
-                              </a:rPr>
-                              <m:t>=</m:t>
-                            </m:r>
-                            <m:d>
-                              <m:dPr>
-                                <m:begChr m:val="["/>
-                                <m:endChr m:val="]"/>
-                                <m:ctrlPr>
-                                  <a:rPr lang="en-US" b="0" i="1" smtClean="0">
-                                    <a:latin typeface="Cambria Math"/>
-                                  </a:rPr>
-                                </m:ctrlPr>
-                              </m:dPr>
+                              </m:e>
                               <m:e>
-                                <m:m>
-                                  <m:mPr>
-                                    <m:mcs>
-                                      <m:mc>
-                                        <m:mcPr>
-                                          <m:count m:val="2"/>
-                                          <m:mcJc m:val="center"/>
-                                        </m:mcPr>
-                                      </m:mc>
-                                    </m:mcs>
-                                    <m:ctrlPr>
-                                      <a:rPr lang="en-US" b="0" i="1" smtClean="0">
-                                        <a:latin typeface="Cambria Math"/>
-                                      </a:rPr>
-                                    </m:ctrlPr>
-                                  </m:mPr>
-                                  <m:mr>
-                                    <m:e>
-                                      <m:r>
-                                        <m:rPr>
-                                          <m:brk m:alnAt="7"/>
-                                        </m:rPr>
-                                        <a:rPr lang="en-US" b="0" i="1" smtClean="0">
-                                          <a:latin typeface="Cambria Math" panose="02040503050406030204" pitchFamily="18" charset="0"/>
-                                        </a:rPr>
-                                        <m:t>2</m:t>
-                                      </m:r>
-                                    </m:e>
-                                    <m:e>
-                                      <m:r>
-                                        <a:rPr lang="en-US" b="0" i="1" smtClean="0">
-                                          <a:latin typeface="Cambria Math" panose="02040503050406030204" pitchFamily="18" charset="0"/>
-                                        </a:rPr>
-                                        <m:t>−1</m:t>
-                                      </m:r>
-                                    </m:e>
-                                  </m:mr>
-                                  <m:mr>
-                                    <m:e>
-                                      <m:r>
-                                        <a:rPr lang="en-US" b="0" i="1" smtClean="0">
-                                          <a:latin typeface="Cambria Math" panose="02040503050406030204" pitchFamily="18" charset="0"/>
-                                        </a:rPr>
-                                        <m:t>−5</m:t>
-                                      </m:r>
-                                    </m:e>
-                                    <m:e>
-                                      <m:r>
-                                        <a:rPr lang="en-US" b="0" i="1" smtClean="0">
-                                          <a:latin typeface="Cambria Math" panose="02040503050406030204" pitchFamily="18" charset="0"/>
-                                        </a:rPr>
-                                        <m:t>−2</m:t>
-                                      </m:r>
-                                    </m:e>
-                                  </m:mr>
-                                </m:m>
-                              </m:e>
-                            </m:d>
-                          </m:e>
-                          <m:e>
-                            <m:r>
-                              <a:rPr lang="en-US" b="0" i="1" smtClean="0">
-                                <a:latin typeface="Cambria Math" panose="02040503050406030204" pitchFamily="18" charset="0"/>
-                              </a:rPr>
-                              <m:t> </m:t>
-                            </m:r>
-                          </m:e>
-                          <m:e>
-                            <m:r>
-                              <a:rPr lang="en-US" b="0" i="1" smtClean="0">
-                                <a:latin typeface="Cambria Math" panose="02040503050406030204" pitchFamily="18" charset="0"/>
-                              </a:rPr>
-                              <m:t>=</m:t>
-                            </m:r>
-                            <m:f>
-                              <m:fPr>
-                                <m:ctrlPr>
-                                  <a:rPr lang="en-US" b="0" i="1" smtClean="0">
-                                    <a:latin typeface="Cambria Math"/>
-                                  </a:rPr>
-                                </m:ctrlPr>
-                              </m:fPr>
-                              <m:num>
                                 <m:r>
-                                  <a:rPr lang="en-US" b="0" i="1" smtClean="0">
+                                  <a:rPr lang="en-US" i="1">
                                     <a:latin typeface="Cambria Math" panose="02040503050406030204" pitchFamily="18" charset="0"/>
                                   </a:rPr>
-                                  <m:t>1</m:t>
+                                  <m:t>𝑠</m:t>
                                 </m:r>
-                              </m:num>
-                              <m:den>
-                                <m:sSup>
-                                  <m:sSupPr>
-                                    <m:ctrlPr>
-                                      <a:rPr lang="en-US" b="0" i="1" smtClean="0">
-                                        <a:latin typeface="Cambria Math"/>
-                                      </a:rPr>
-                                    </m:ctrlPr>
-                                  </m:sSupPr>
-                                  <m:e>
-                                    <m:r>
-                                      <a:rPr lang="en-US" b="0" i="1" smtClean="0">
-                                        <a:latin typeface="Cambria Math" panose="02040503050406030204" pitchFamily="18" charset="0"/>
-                                      </a:rPr>
-                                      <m:t>𝑠</m:t>
-                                    </m:r>
-                                  </m:e>
-                                  <m:sup>
-                                    <m:r>
-                                      <a:rPr lang="en-US" b="0" i="1" smtClean="0">
-                                        <a:latin typeface="Cambria Math" panose="02040503050406030204" pitchFamily="18" charset="0"/>
-                                      </a:rPr>
-                                      <m:t>2</m:t>
-                                    </m:r>
-                                  </m:sup>
-                                </m:sSup>
                                 <m:r>
-                                  <a:rPr lang="en-US" b="0" i="1" smtClean="0">
+                                  <a:rPr lang="en-US" i="1">
                                     <a:latin typeface="Cambria Math" panose="02040503050406030204" pitchFamily="18" charset="0"/>
                                   </a:rPr>
-                                  <m:t>−9</m:t>
+                                  <m:t>−2</m:t>
                                 </m:r>
-                              </m:den>
-                            </m:f>
-                            <m:d>
-                              <m:dPr>
-                                <m:begChr m:val="["/>
-                                <m:endChr m:val="]"/>
-                                <m:ctrlPr>
-                                  <a:rPr lang="en-US" b="0" i="1" smtClean="0">
-                                    <a:latin typeface="Cambria Math"/>
-                                  </a:rPr>
-                                </m:ctrlPr>
-                              </m:dPr>
-                              <m:e>
-                                <m:m>
-                                  <m:mPr>
-                                    <m:mcs>
-                                      <m:mc>
-                                        <m:mcPr>
-                                          <m:count m:val="2"/>
-                                          <m:mcJc m:val="center"/>
-                                        </m:mcPr>
-                                      </m:mc>
-                                    </m:mcs>
-                                    <m:ctrlPr>
-                                      <a:rPr lang="en-US" b="0" i="1" smtClean="0">
-                                        <a:latin typeface="Cambria Math"/>
-                                      </a:rPr>
-                                    </m:ctrlPr>
-                                  </m:mPr>
-                                  <m:mr>
-                                    <m:e>
-                                      <m:r>
-                                        <m:rPr>
-                                          <m:brk m:alnAt="7"/>
-                                        </m:rPr>
-                                        <a:rPr lang="en-US" b="0" i="1" smtClean="0">
-                                          <a:latin typeface="Cambria Math" panose="02040503050406030204" pitchFamily="18" charset="0"/>
-                                        </a:rPr>
-                                        <m:t>𝑠</m:t>
-                                      </m:r>
-                                      <m:r>
-                                        <a:rPr lang="en-US" b="0" i="1" smtClean="0">
-                                          <a:latin typeface="Cambria Math" panose="02040503050406030204" pitchFamily="18" charset="0"/>
-                                        </a:rPr>
-                                        <m:t>+</m:t>
-                                      </m:r>
-                                      <m:r>
-                                        <m:rPr>
-                                          <m:brk m:alnAt="7"/>
-                                        </m:rPr>
-                                        <a:rPr lang="en-US" b="0" i="1" smtClean="0">
-                                          <a:latin typeface="Cambria Math" panose="02040503050406030204" pitchFamily="18" charset="0"/>
-                                        </a:rPr>
-                                        <m:t>2</m:t>
-                                      </m:r>
-                                    </m:e>
-                                    <m:e>
-                                      <m:r>
-                                        <a:rPr lang="en-US" b="0" i="1" smtClean="0">
-                                          <a:latin typeface="Cambria Math" panose="02040503050406030204" pitchFamily="18" charset="0"/>
-                                        </a:rPr>
-                                        <m:t>−1</m:t>
-                                      </m:r>
-                                    </m:e>
-                                  </m:mr>
-                                  <m:mr>
-                                    <m:e>
-                                      <m:r>
-                                        <a:rPr lang="en-US" b="0" i="1" smtClean="0">
-                                          <a:latin typeface="Cambria Math" panose="02040503050406030204" pitchFamily="18" charset="0"/>
-                                        </a:rPr>
-                                        <m:t>−2</m:t>
-                                      </m:r>
-                                    </m:e>
-                                    <m:e>
-                                      <m:r>
-                                        <a:rPr lang="en-US" b="0" i="1" smtClean="0">
-                                          <a:latin typeface="Cambria Math" panose="02040503050406030204" pitchFamily="18" charset="0"/>
-                                        </a:rPr>
-                                        <m:t>𝑠</m:t>
-                                      </m:r>
-                                      <m:r>
-                                        <a:rPr lang="en-US" b="0" i="1" smtClean="0">
-                                          <a:latin typeface="Cambria Math" panose="02040503050406030204" pitchFamily="18" charset="0"/>
-                                        </a:rPr>
-                                        <m:t>−2</m:t>
-                                      </m:r>
-                                    </m:e>
-                                  </m:mr>
-                                </m:m>
                               </m:e>
-                            </m:d>
-                          </m:e>
-                        </m:mr>
-                      </m:m>
+                            </m:mr>
+                          </m:m>
+                        </m:e>
+                      </m:d>
                     </m:oMath>
                   </m:oMathPara>
+                </a14:m>
+                <a:endParaRPr lang="en-US" b="0" dirty="0" smtClean="0"/>
+              </a:p>
+              <a:p>
+                <a:pPr marL="0" indent="0">
+                  <a:buNone/>
+                </a:pPr>
+                <a:r>
+                  <a:rPr lang="en-US" dirty="0" smtClean="0"/>
+                  <a:t>	</a:t>
+                </a:r>
+                <a14:m>
+                  <m:oMath xmlns:m="http://schemas.openxmlformats.org/officeDocument/2006/math">
+                    <m:r>
+                      <a:rPr lang="en-US" i="1">
+                        <a:latin typeface="Cambria Math" panose="02040503050406030204" pitchFamily="18" charset="0"/>
+                      </a:rPr>
+                      <m:t>ℋ</m:t>
+                    </m:r>
+                    <m:r>
+                      <a:rPr lang="en-US" i="1">
+                        <a:latin typeface="Cambria Math" panose="02040503050406030204" pitchFamily="18" charset="0"/>
+                      </a:rPr>
+                      <m:t>=</m:t>
+                    </m:r>
+                    <m:d>
+                      <m:dPr>
+                        <m:begChr m:val="["/>
+                        <m:endChr m:val="]"/>
+                        <m:ctrlPr>
+                          <a:rPr lang="en-US" i="1">
+                            <a:latin typeface="Cambria Math"/>
+                          </a:rPr>
+                        </m:ctrlPr>
+                      </m:dPr>
+                      <m:e>
+                        <m:m>
+                          <m:mPr>
+                            <m:mcs>
+                              <m:mc>
+                                <m:mcPr>
+                                  <m:count m:val="2"/>
+                                  <m:mcJc m:val="center"/>
+                                </m:mcPr>
+                              </m:mc>
+                            </m:mcs>
+                            <m:ctrlPr>
+                              <a:rPr lang="en-US" i="1">
+                                <a:latin typeface="Cambria Math"/>
+                              </a:rPr>
+                            </m:ctrlPr>
+                          </m:mPr>
+                          <m:mr>
+                            <m:e>
+                              <m:r>
+                                <m:rPr>
+                                  <m:brk m:alnAt="7"/>
+                                </m:rPr>
+                                <a:rPr lang="en-US" i="1">
+                                  <a:latin typeface="Cambria Math" panose="02040503050406030204" pitchFamily="18" charset="0"/>
+                                </a:rPr>
+                                <m:t>2</m:t>
+                              </m:r>
+                            </m:e>
+                            <m:e>
+                              <m:r>
+                                <a:rPr lang="en-US" i="1">
+                                  <a:latin typeface="Cambria Math" panose="02040503050406030204" pitchFamily="18" charset="0"/>
+                                </a:rPr>
+                                <m:t>−1</m:t>
+                              </m:r>
+                            </m:e>
+                          </m:mr>
+                          <m:mr>
+                            <m:e>
+                              <m:r>
+                                <a:rPr lang="en-US" i="1">
+                                  <a:latin typeface="Cambria Math" panose="02040503050406030204" pitchFamily="18" charset="0"/>
+                                </a:rPr>
+                                <m:t>−5</m:t>
+                              </m:r>
+                            </m:e>
+                            <m:e>
+                              <m:r>
+                                <a:rPr lang="en-US" i="1">
+                                  <a:latin typeface="Cambria Math" panose="02040503050406030204" pitchFamily="18" charset="0"/>
+                                </a:rPr>
+                                <m:t>−2</m:t>
+                              </m:r>
+                            </m:e>
+                          </m:mr>
+                        </m:m>
+                      </m:e>
+                    </m:d>
+                  </m:oMath>
                 </a14:m>
                 <a:r>
                   <a:rPr lang="en-US" b="0" dirty="0" smtClean="0"/>
@@ -6691,7 +6639,7 @@
             </p:txBody>
           </p:sp>
         </mc:Choice>
-        <mc:Fallback xmlns="">
+        <mc:Fallback>
           <p:sp>
             <p:nvSpPr>
               <p:cNvPr id="2" name="Text Placeholder 1"/>
@@ -6703,7 +6651,7 @@
               </p:nvPr>
             </p:nvSpPr>
             <p:spPr>
-              <a:blipFill rotWithShape="0">
+              <a:blipFill rotWithShape="1">
                 <a:blip r:embed="rId2"/>
                 <a:stretch>
                   <a:fillRect/>
@@ -6827,6 +6775,12 @@
                             </a:rPr>
                             <m:t>ℋ</m:t>
                           </m:r>
+                          <m:r>
+                            <a:rPr lang="en-US" b="0" i="1" smtClean="0">
+                              <a:latin typeface="Cambria Math"/>
+                            </a:rPr>
+                            <m:t>𝑡</m:t>
+                          </m:r>
                         </m:sup>
                       </m:sSup>
                       <m:r>
@@ -6859,13 +6813,7 @@
                             <a:rPr lang="en-US" b="0" i="1" smtClean="0">
                               <a:latin typeface="Cambria Math" panose="02040503050406030204" pitchFamily="18" charset="0"/>
                             </a:rPr>
-                            <m:t>−</m:t>
-                          </m:r>
-                          <m:r>
-                            <a:rPr lang="en-US" b="0" i="1" smtClean="0">
-                              <a:latin typeface="Cambria Math" panose="02040503050406030204" pitchFamily="18" charset="0"/>
-                            </a:rPr>
-                            <m:t>1</m:t>
+                            <m:t>−1</m:t>
                           </m:r>
                         </m:sup>
                       </m:sSup>
@@ -6915,13 +6863,7 @@
                                   <a:rPr lang="en-US" b="0" i="1" smtClean="0">
                                     <a:latin typeface="Cambria Math" panose="02040503050406030204" pitchFamily="18" charset="0"/>
                                   </a:rPr>
-                                  <m:t>+</m:t>
-                                </m:r>
-                                <m:r>
-                                  <a:rPr lang="en-US" b="0" i="1" smtClean="0">
-                                    <a:latin typeface="Cambria Math" panose="02040503050406030204" pitchFamily="18" charset="0"/>
-                                  </a:rPr>
-                                  <m:t>2</m:t>
+                                  <m:t>+2</m:t>
                                 </m:r>
                               </m:num>
                               <m:den>
@@ -6947,13 +6889,7 @@
                                       <a:rPr lang="en-US" b="0" i="1" smtClean="0">
                                         <a:latin typeface="Cambria Math" panose="02040503050406030204" pitchFamily="18" charset="0"/>
                                       </a:rPr>
-                                      <m:t>+</m:t>
-                                    </m:r>
-                                    <m:r>
-                                      <a:rPr lang="en-US" b="0" i="1" smtClean="0">
-                                        <a:latin typeface="Cambria Math" panose="02040503050406030204" pitchFamily="18" charset="0"/>
-                                      </a:rPr>
-                                      <m:t>3</m:t>
+                                      <m:t>+3</m:t>
                                     </m:r>
                                   </m:e>
                                 </m:d>
@@ -6979,13 +6915,7 @@
                                       <a:rPr lang="en-US" b="0" i="1" smtClean="0">
                                         <a:latin typeface="Cambria Math" panose="02040503050406030204" pitchFamily="18" charset="0"/>
                                       </a:rPr>
-                                      <m:t>−</m:t>
-                                    </m:r>
-                                    <m:r>
-                                      <a:rPr lang="en-US" b="0" i="1" smtClean="0">
-                                        <a:latin typeface="Cambria Math" panose="02040503050406030204" pitchFamily="18" charset="0"/>
-                                      </a:rPr>
-                                      <m:t>3</m:t>
+                                      <m:t>−3</m:t>
                                     </m:r>
                                   </m:e>
                                 </m:d>
@@ -7035,13 +6965,7 @@
                                       <a:rPr lang="en-US" b="0" i="1" smtClean="0">
                                         <a:latin typeface="Cambria Math" panose="02040503050406030204" pitchFamily="18" charset="0"/>
                                       </a:rPr>
-                                      <m:t>+</m:t>
-                                    </m:r>
-                                    <m:r>
-                                      <a:rPr lang="en-US" b="0" i="1" smtClean="0">
-                                        <a:latin typeface="Cambria Math" panose="02040503050406030204" pitchFamily="18" charset="0"/>
-                                      </a:rPr>
-                                      <m:t>3</m:t>
+                                      <m:t>+3</m:t>
                                     </m:r>
                                   </m:e>
                                 </m:d>
@@ -7064,13 +6988,7 @@
                                       <a:rPr lang="en-US" b="0" i="1" smtClean="0">
                                         <a:latin typeface="Cambria Math" panose="02040503050406030204" pitchFamily="18" charset="0"/>
                                       </a:rPr>
-                                      <m:t>−</m:t>
-                                    </m:r>
-                                    <m:r>
-                                      <a:rPr lang="en-US" b="0" i="1" smtClean="0">
-                                        <a:latin typeface="Cambria Math" panose="02040503050406030204" pitchFamily="18" charset="0"/>
-                                      </a:rPr>
-                                      <m:t>3</m:t>
+                                      <m:t>−3</m:t>
                                     </m:r>
                                   </m:e>
                                 </m:d>
@@ -7093,13 +7011,7 @@
                                   <a:rPr lang="en-US" b="0" i="1" smtClean="0">
                                     <a:latin typeface="Cambria Math" panose="02040503050406030204" pitchFamily="18" charset="0"/>
                                   </a:rPr>
-                                  <m:t>−</m:t>
-                                </m:r>
-                                <m:r>
-                                  <a:rPr lang="en-US" b="0" i="1" smtClean="0">
-                                    <a:latin typeface="Cambria Math" panose="02040503050406030204" pitchFamily="18" charset="0"/>
-                                  </a:rPr>
-                                  <m:t>2</m:t>
+                                  <m:t>−2</m:t>
                                 </m:r>
                               </m:num>
                               <m:den>
@@ -7125,13 +7037,7 @@
                                       <a:rPr lang="en-US" i="1">
                                         <a:latin typeface="Cambria Math" panose="02040503050406030204" pitchFamily="18" charset="0"/>
                                       </a:rPr>
-                                      <m:t>+</m:t>
-                                    </m:r>
-                                    <m:r>
-                                      <a:rPr lang="en-US" i="1">
-                                        <a:latin typeface="Cambria Math" panose="02040503050406030204" pitchFamily="18" charset="0"/>
-                                      </a:rPr>
-                                      <m:t>3</m:t>
+                                      <m:t>+3</m:t>
                                     </m:r>
                                   </m:e>
                                 </m:d>
@@ -7157,13 +7063,7 @@
                                       <a:rPr lang="en-US" i="1">
                                         <a:latin typeface="Cambria Math" panose="02040503050406030204" pitchFamily="18" charset="0"/>
                                       </a:rPr>
-                                      <m:t>−</m:t>
-                                    </m:r>
-                                    <m:r>
-                                      <a:rPr lang="en-US" i="1">
-                                        <a:latin typeface="Cambria Math" panose="02040503050406030204" pitchFamily="18" charset="0"/>
-                                      </a:rPr>
-                                      <m:t>3</m:t>
+                                      <m:t>−3</m:t>
                                     </m:r>
                                   </m:e>
                                 </m:d>
@@ -7190,13 +7090,7 @@
                                   <a:rPr lang="en-US" b="0" i="1" smtClean="0">
                                     <a:latin typeface="Cambria Math" panose="02040503050406030204" pitchFamily="18" charset="0"/>
                                   </a:rPr>
-                                  <m:t>−</m:t>
-                                </m:r>
-                                <m:r>
-                                  <a:rPr lang="en-US" b="0" i="1" smtClean="0">
-                                    <a:latin typeface="Cambria Math" panose="02040503050406030204" pitchFamily="18" charset="0"/>
-                                  </a:rPr>
-                                  <m:t>2</m:t>
+                                  <m:t>−2</m:t>
                                 </m:r>
                               </m:num>
                               <m:den>
@@ -7222,13 +7116,7 @@
                                       <a:rPr lang="en-US" i="1">
                                         <a:latin typeface="Cambria Math" panose="02040503050406030204" pitchFamily="18" charset="0"/>
                                       </a:rPr>
-                                      <m:t>+</m:t>
-                                    </m:r>
-                                    <m:r>
-                                      <a:rPr lang="en-US" i="1">
-                                        <a:latin typeface="Cambria Math" panose="02040503050406030204" pitchFamily="18" charset="0"/>
-                                      </a:rPr>
-                                      <m:t>3</m:t>
+                                      <m:t>+3</m:t>
                                     </m:r>
                                   </m:e>
                                 </m:d>
@@ -7254,13 +7142,7 @@
                                       <a:rPr lang="en-US" i="1">
                                         <a:latin typeface="Cambria Math" panose="02040503050406030204" pitchFamily="18" charset="0"/>
                                       </a:rPr>
-                                      <m:t>−</m:t>
-                                    </m:r>
-                                    <m:r>
-                                      <a:rPr lang="en-US" i="1">
-                                        <a:latin typeface="Cambria Math" panose="02040503050406030204" pitchFamily="18" charset="0"/>
-                                      </a:rPr>
-                                      <m:t>3</m:t>
+                                      <m:t>−3</m:t>
                                     </m:r>
                                   </m:e>
                                 </m:d>
@@ -7508,13 +7390,7 @@
                                       <a:rPr lang="en-US" b="0" i="1" smtClean="0">
                                         <a:latin typeface="Cambria Math" panose="02040503050406030204" pitchFamily="18" charset="0"/>
                                       </a:rPr>
-                                      <m:t>−</m:t>
-                                    </m:r>
-                                    <m:r>
-                                      <a:rPr lang="en-US" b="0" i="1" smtClean="0">
-                                        <a:latin typeface="Cambria Math" panose="02040503050406030204" pitchFamily="18" charset="0"/>
-                                      </a:rPr>
-                                      <m:t>3</m:t>
+                                      <m:t>−3</m:t>
                                     </m:r>
                                     <m:r>
                                       <a:rPr lang="en-US" b="0" i="1" smtClean="0">
@@ -7636,13 +7512,7 @@
                                       <a:rPr lang="en-US" b="0" i="1" smtClean="0">
                                         <a:latin typeface="Cambria Math" panose="02040503050406030204" pitchFamily="18" charset="0"/>
                                       </a:rPr>
-                                      <m:t>−</m:t>
-                                    </m:r>
-                                    <m:r>
-                                      <a:rPr lang="en-US" b="0" i="1" smtClean="0">
-                                        <a:latin typeface="Cambria Math" panose="02040503050406030204" pitchFamily="18" charset="0"/>
-                                      </a:rPr>
-                                      <m:t>3</m:t>
+                                      <m:t>−3</m:t>
                                     </m:r>
                                     <m:r>
                                       <a:rPr lang="en-US" b="0" i="1" smtClean="0">
@@ -7768,13 +7638,7 @@
                                       <a:rPr lang="en-US" b="0" i="1" smtClean="0">
                                         <a:latin typeface="Cambria Math" panose="02040503050406030204" pitchFamily="18" charset="0"/>
                                       </a:rPr>
-                                      <m:t>−</m:t>
-                                    </m:r>
-                                    <m:r>
-                                      <a:rPr lang="en-US" b="0" i="1" smtClean="0">
-                                        <a:latin typeface="Cambria Math" panose="02040503050406030204" pitchFamily="18" charset="0"/>
-                                      </a:rPr>
-                                      <m:t>3</m:t>
+                                      <m:t>−3</m:t>
                                     </m:r>
                                     <m:r>
                                       <a:rPr lang="en-US" b="0" i="1" smtClean="0">
@@ -7946,8 +7810,8 @@
           <a:chExt cx="0" cy="0"/>
         </a:xfrm>
       </p:grpSpPr>
-      <mc:AlternateContent xmlns:mc="http://schemas.openxmlformats.org/markup-compatibility/2006">
-        <mc:Choice xmlns:a14="http://schemas.microsoft.com/office/drawing/2010/main" Requires="a14">
+      <mc:AlternateContent xmlns:mc="http://schemas.openxmlformats.org/markup-compatibility/2006" xmlns:a14="http://schemas.microsoft.com/office/drawing/2010/main">
+        <mc:Choice Requires="a14">
           <p:sp>
             <p:nvSpPr>
               <p:cNvPr id="2" name="Text Placeholder 1"/>
@@ -9931,7 +9795,7 @@
             </p:txBody>
           </p:sp>
         </mc:Choice>
-        <mc:Fallback>
+        <mc:Fallback xmlns="">
           <p:sp>
             <p:nvSpPr>
               <p:cNvPr id="2" name="Text Placeholder 1"/>
@@ -10725,12 +10589,16 @@
                   <a:t> </a:t>
                 </a:r>
                 <a:r>
+                  <a:rPr lang="en-US" dirty="0" smtClean="0"/>
+                  <a:t>(</a:t>
+                </a:r>
+                <a:r>
                   <a:rPr lang="en-US" dirty="0" err="1" smtClean="0"/>
                   <a:t>Riccati</a:t>
                 </a:r>
                 <a:r>
                   <a:rPr lang="en-US" dirty="0" smtClean="0"/>
-                  <a:t> Equation</a:t>
+                  <a:t> Equation)</a:t>
                 </a:r>
                 <a:endParaRPr lang="en-US" dirty="0"/>
               </a:p>
@@ -10939,20 +10807,10 @@
                           </m:r>
                         </m:e>
                       </m:d>
-                      <m:r>
-                        <a:rPr lang="en-US" sz="2000" b="0" i="1" smtClean="0">
-                          <a:latin typeface="Cambria Math"/>
-                        </a:rPr>
-                        <m:t>[</m:t>
-                      </m:r>
-                      <m:r>
-                        <a:rPr lang="en-US" sz="2000" b="0" i="1" smtClean="0">
-                          <a:latin typeface="Cambria Math"/>
-                        </a:rPr>
-                        <m:t>𝐴𝑥</m:t>
-                      </m:r>
                       <m:d>
                         <m:dPr>
+                          <m:begChr m:val="["/>
+                          <m:endChr m:val="]"/>
                           <m:ctrlPr>
                             <a:rPr lang="en-US" sz="2000" b="0" i="1" smtClean="0">
                               <a:latin typeface="Cambria Math"/>
@@ -10964,157 +10822,174 @@
                             <a:rPr lang="en-US" sz="2000" b="0" i="1" smtClean="0">
                               <a:latin typeface="Cambria Math"/>
                             </a:rPr>
-                            <m:t>𝑡</m:t>
-                          </m:r>
-                        </m:e>
-                      </m:d>
-                      <m:r>
-                        <a:rPr lang="en-US" sz="2000" b="0" i="1" smtClean="0">
-                          <a:latin typeface="Cambria Math"/>
-                        </a:rPr>
-                        <m:t>−</m:t>
-                      </m:r>
-                      <m:r>
-                        <a:rPr lang="en-US" sz="2000" b="0" i="1" smtClean="0">
-                          <a:latin typeface="Cambria Math"/>
-                        </a:rPr>
-                        <m:t>𝐵</m:t>
-                      </m:r>
-                      <m:sSup>
-                        <m:sSupPr>
-                          <m:ctrlPr>
+                            <m:t>𝐴𝑥</m:t>
+                          </m:r>
+                          <m:d>
+                            <m:dPr>
+                              <m:ctrlPr>
+                                <a:rPr lang="en-US" sz="2000" b="0" i="1" smtClean="0">
+                                  <a:latin typeface="Cambria Math"/>
+                                </a:rPr>
+                              </m:ctrlPr>
+                            </m:dPr>
+                            <m:e>
+                              <m:r>
+                                <a:rPr lang="en-US" sz="2000" b="0" i="1" smtClean="0">
+                                  <a:latin typeface="Cambria Math"/>
+                                </a:rPr>
+                                <m:t>𝑡</m:t>
+                              </m:r>
+                            </m:e>
+                          </m:d>
+                          <m:r>
                             <a:rPr lang="en-US" sz="2000" b="0" i="1" smtClean="0">
                               <a:latin typeface="Cambria Math"/>
                             </a:rPr>
-                          </m:ctrlPr>
-                        </m:sSupPr>
-                        <m:e>
+                            <m:t>−</m:t>
+                          </m:r>
                           <m:r>
                             <a:rPr lang="en-US" sz="2000" b="0" i="1" smtClean="0">
                               <a:latin typeface="Cambria Math"/>
                             </a:rPr>
-                            <m:t>𝑅</m:t>
-                          </m:r>
-                        </m:e>
-                        <m:sup>
+                            <m:t>𝐵</m:t>
+                          </m:r>
+                          <m:sSup>
+                            <m:sSupPr>
+                              <m:ctrlPr>
+                                <a:rPr lang="en-US" sz="2000" b="0" i="1" smtClean="0">
+                                  <a:latin typeface="Cambria Math"/>
+                                </a:rPr>
+                              </m:ctrlPr>
+                            </m:sSupPr>
+                            <m:e>
+                              <m:r>
+                                <a:rPr lang="en-US" sz="2000" b="0" i="1" smtClean="0">
+                                  <a:latin typeface="Cambria Math"/>
+                                </a:rPr>
+                                <m:t>𝑅</m:t>
+                              </m:r>
+                            </m:e>
+                            <m:sup>
+                              <m:r>
+                                <a:rPr lang="en-US" sz="2000" b="0" i="1" smtClean="0">
+                                  <a:latin typeface="Cambria Math"/>
+                                </a:rPr>
+                                <m:t>−1</m:t>
+                              </m:r>
+                            </m:sup>
+                          </m:sSup>
+                          <m:sSup>
+                            <m:sSupPr>
+                              <m:ctrlPr>
+                                <a:rPr lang="en-US" sz="2000" b="0" i="1" smtClean="0">
+                                  <a:latin typeface="Cambria Math"/>
+                                </a:rPr>
+                              </m:ctrlPr>
+                            </m:sSupPr>
+                            <m:e>
+                              <m:r>
+                                <a:rPr lang="en-US" sz="2000" b="0" i="1" smtClean="0">
+                                  <a:latin typeface="Cambria Math"/>
+                                </a:rPr>
+                                <m:t>𝐵</m:t>
+                              </m:r>
+                            </m:e>
+                            <m:sup>
+                              <m:r>
+                                <a:rPr lang="en-US" sz="2000" b="0" i="1" smtClean="0">
+                                  <a:latin typeface="Cambria Math"/>
+                                </a:rPr>
+                                <m:t>𝑇</m:t>
+                              </m:r>
+                            </m:sup>
+                          </m:sSup>
                           <m:r>
                             <a:rPr lang="en-US" sz="2000" b="0" i="1" smtClean="0">
                               <a:latin typeface="Cambria Math"/>
                             </a:rPr>
-                            <m:t>−1</m:t>
-                          </m:r>
-                        </m:sup>
-                      </m:sSup>
-                      <m:sSup>
-                        <m:sSupPr>
-                          <m:ctrlPr>
+                            <m:t>𝜆</m:t>
+                          </m:r>
+                          <m:d>
+                            <m:dPr>
+                              <m:ctrlPr>
+                                <a:rPr lang="en-US" sz="2000" b="0" i="1" smtClean="0">
+                                  <a:latin typeface="Cambria Math"/>
+                                </a:rPr>
+                              </m:ctrlPr>
+                            </m:dPr>
+                            <m:e>
+                              <m:r>
+                                <a:rPr lang="en-US" sz="2000" b="0" i="1" smtClean="0">
+                                  <a:latin typeface="Cambria Math"/>
+                                </a:rPr>
+                                <m:t>𝑡</m:t>
+                              </m:r>
+                            </m:e>
+                          </m:d>
+                          <m:r>
                             <a:rPr lang="en-US" sz="2000" b="0" i="1" smtClean="0">
                               <a:latin typeface="Cambria Math"/>
                             </a:rPr>
-                          </m:ctrlPr>
-                        </m:sSupPr>
-                        <m:e>
+                            <m:t>+</m:t>
+                          </m:r>
+                          <m:acc>
+                            <m:accPr>
+                              <m:chr m:val="̇"/>
+                              <m:ctrlPr>
+                                <a:rPr lang="en-US" sz="2000" b="0" i="1" smtClean="0">
+                                  <a:latin typeface="Cambria Math"/>
+                                </a:rPr>
+                              </m:ctrlPr>
+                            </m:accPr>
+                            <m:e>
+                              <m:r>
+                                <a:rPr lang="en-US" sz="2000" b="0" i="1" smtClean="0">
+                                  <a:latin typeface="Cambria Math"/>
+                                </a:rPr>
+                                <m:t>𝑃</m:t>
+                              </m:r>
+                            </m:e>
+                          </m:acc>
+                          <m:d>
+                            <m:dPr>
+                              <m:ctrlPr>
+                                <a:rPr lang="en-US" sz="2000" b="0" i="1" smtClean="0">
+                                  <a:latin typeface="Cambria Math"/>
+                                </a:rPr>
+                              </m:ctrlPr>
+                            </m:dPr>
+                            <m:e>
+                              <m:r>
+                                <a:rPr lang="en-US" sz="2000" b="0" i="1" smtClean="0">
+                                  <a:latin typeface="Cambria Math"/>
+                                </a:rPr>
+                                <m:t>𝑡</m:t>
+                              </m:r>
+                            </m:e>
+                          </m:d>
                           <m:r>
                             <a:rPr lang="en-US" sz="2000" b="0" i="1" smtClean="0">
                               <a:latin typeface="Cambria Math"/>
                             </a:rPr>
-                            <m:t>𝐵</m:t>
-                          </m:r>
-                        </m:e>
-                        <m:sup>
-                          <m:r>
-                            <a:rPr lang="en-US" sz="2000" b="0" i="1" smtClean="0">
-                              <a:latin typeface="Cambria Math"/>
-                            </a:rPr>
-                            <m:t>𝑇</m:t>
-                          </m:r>
-                        </m:sup>
-                      </m:sSup>
-                      <m:r>
-                        <a:rPr lang="en-US" sz="2000" b="0" i="1" smtClean="0">
-                          <a:latin typeface="Cambria Math"/>
-                        </a:rPr>
-                        <m:t>𝜆</m:t>
-                      </m:r>
-                      <m:d>
-                        <m:dPr>
-                          <m:ctrlPr>
-                            <a:rPr lang="en-US" sz="2000" b="0" i="1" smtClean="0">
-                              <a:latin typeface="Cambria Math"/>
-                            </a:rPr>
-                          </m:ctrlPr>
-                        </m:dPr>
-                        <m:e>
-                          <m:r>
-                            <a:rPr lang="en-US" sz="2000" b="0" i="1" smtClean="0">
-                              <a:latin typeface="Cambria Math"/>
-                            </a:rPr>
-                            <m:t>𝑡</m:t>
-                          </m:r>
-                        </m:e>
-                      </m:d>
-                      <m:r>
-                        <a:rPr lang="en-US" sz="2000" b="0" i="1" smtClean="0">
-                          <a:latin typeface="Cambria Math"/>
-                        </a:rPr>
-                        <m:t>+</m:t>
-                      </m:r>
-                      <m:acc>
-                        <m:accPr>
-                          <m:chr m:val="̇"/>
-                          <m:ctrlPr>
-                            <a:rPr lang="en-US" sz="2000" b="0" i="1" smtClean="0">
-                              <a:latin typeface="Cambria Math"/>
-                            </a:rPr>
-                          </m:ctrlPr>
-                        </m:accPr>
-                        <m:e>
-                          <m:r>
-                            <a:rPr lang="en-US" sz="2000" b="0" i="1" smtClean="0">
-                              <a:latin typeface="Cambria Math"/>
-                            </a:rPr>
-                            <m:t>𝑃</m:t>
-                          </m:r>
-                        </m:e>
-                      </m:acc>
-                      <m:d>
-                        <m:dPr>
-                          <m:ctrlPr>
-                            <a:rPr lang="en-US" sz="2000" b="0" i="1" smtClean="0">
-                              <a:latin typeface="Cambria Math"/>
-                            </a:rPr>
-                          </m:ctrlPr>
-                        </m:dPr>
-                        <m:e>
-                          <m:r>
-                            <a:rPr lang="en-US" sz="2000" b="0" i="1" smtClean="0">
-                              <a:latin typeface="Cambria Math"/>
-                            </a:rPr>
-                            <m:t>𝑡</m:t>
-                          </m:r>
-                        </m:e>
-                      </m:d>
-                      <m:r>
-                        <a:rPr lang="en-US" sz="2000" b="0" i="1" smtClean="0">
-                          <a:latin typeface="Cambria Math"/>
-                        </a:rPr>
-                        <m:t>𝑥</m:t>
-                      </m:r>
-                      <m:d>
-                        <m:dPr>
-                          <m:ctrlPr>
-                            <a:rPr lang="en-US" sz="2000" b="0" i="1" smtClean="0">
-                              <a:latin typeface="Cambria Math"/>
-                            </a:rPr>
-                          </m:ctrlPr>
-                        </m:dPr>
-                        <m:e>
-                          <m:r>
-                            <a:rPr lang="en-US" sz="2000" b="0" i="1" smtClean="0">
-                              <a:latin typeface="Cambria Math"/>
-                            </a:rPr>
-                            <m:t>𝑡</m:t>
-                          </m:r>
+                            <m:t>𝑥</m:t>
+                          </m:r>
+                          <m:d>
+                            <m:dPr>
+                              <m:ctrlPr>
+                                <a:rPr lang="en-US" sz="2000" b="0" i="1" smtClean="0">
+                                  <a:latin typeface="Cambria Math"/>
+                                </a:rPr>
+                              </m:ctrlPr>
+                            </m:dPr>
+                            <m:e>
+                              <m:r>
+                                <a:rPr lang="en-US" sz="2000" b="0" i="1" smtClean="0">
+                                  <a:latin typeface="Cambria Math"/>
+                                </a:rPr>
+                                <m:t>𝑡</m:t>
+                              </m:r>
+                            </m:e>
+                          </m:d>
                         </m:e>
                       </m:d>
                     </m:oMath>
@@ -12070,15 +11945,19 @@
                 </a:r>
                 <a:r>
                   <a:rPr lang="en-US" dirty="0" smtClean="0"/>
-                  <a:t> solution </a:t>
+                  <a:t> </a:t>
                 </a:r>
                 <a:r>
-                  <a:rPr lang="en-US" dirty="0" err="1" smtClean="0"/>
-                  <a:t>alos</a:t>
+                  <a:rPr lang="en-US" smtClean="0"/>
+                  <a:t>solution </a:t>
+                </a:r>
+                <a:r>
+                  <a:rPr lang="en-US" smtClean="0"/>
+                  <a:t>also </a:t>
                 </a:r>
                 <a:r>
                   <a:rPr lang="en-US" dirty="0" smtClean="0"/>
-                  <a:t> gives optimal cost</a:t>
+                  <a:t>gives optimal cost</a:t>
                 </a:r>
                 <a:endParaRPr lang="en-US" dirty="0"/>
               </a:p>
@@ -12180,8 +12059,8 @@
           <a:chExt cx="0" cy="0"/>
         </a:xfrm>
       </p:grpSpPr>
-      <mc:AlternateContent xmlns:mc="http://schemas.openxmlformats.org/markup-compatibility/2006">
-        <mc:Choice xmlns:a14="http://schemas.microsoft.com/office/drawing/2010/main" Requires="a14">
+      <mc:AlternateContent xmlns:mc="http://schemas.openxmlformats.org/markup-compatibility/2006" xmlns:a14="http://schemas.microsoft.com/office/drawing/2010/main">
+        <mc:Choice Requires="a14">
           <p:sp>
             <p:nvSpPr>
               <p:cNvPr id="2" name="Text Placeholder 1"/>
@@ -13253,7 +13132,7 @@
             </p:txBody>
           </p:sp>
         </mc:Choice>
-        <mc:Fallback>
+        <mc:Fallback xmlns="">
           <p:sp>
             <p:nvSpPr>
               <p:cNvPr id="2" name="Text Placeholder 1"/>
@@ -13808,7 +13687,7 @@
   </a:extraClrSchemeLst>
   <a:extLst>
     <a:ext uri="{05A4C25C-085E-4340-85A3-A5531E510DB2}">
-      <thm15:themeFamily xmlns:thm15="http://schemas.microsoft.com/office/thememl/2012/main" xmlns="" name="Better Layout.potx" id="{C6D3D107-2D19-406A-B4DE-DC53AD81D2C6}" vid="{A8C32F2A-968F-4119-8FF3-1773AC1DB11F}"/>
+      <thm15:themeFamily xmlns="" xmlns:thm15="http://schemas.microsoft.com/office/thememl/2012/main" name="Better Layout.potx" id="{C6D3D107-2D19-406A-B4DE-DC53AD81D2C6}" vid="{A8C32F2A-968F-4119-8FF3-1773AC1DB11F}"/>
     </a:ext>
   </a:extLst>
 </a:theme>

</xml_diff>